<commit_message>
Insert e Update collaudati
</commit_message>
<xml_diff>
--- a/File Report/database/lista operazioni.pptx
+++ b/File Report/database/lista operazioni.pptx
@@ -244,7 +244,7 @@
           <a:p>
             <a:fld id="{0DAF859A-778D-45BB-B73F-DBDF9DC3F39E}" type="datetimeFigureOut">
               <a:rPr lang="it-IT" smtClean="0"/>
-              <a:t>23/04/2018</a:t>
+              <a:t>24/04/2018</a:t>
             </a:fld>
             <a:endParaRPr lang="it-IT"/>
           </a:p>
@@ -414,7 +414,7 @@
           <a:p>
             <a:fld id="{0DAF859A-778D-45BB-B73F-DBDF9DC3F39E}" type="datetimeFigureOut">
               <a:rPr lang="it-IT" smtClean="0"/>
-              <a:t>23/04/2018</a:t>
+              <a:t>24/04/2018</a:t>
             </a:fld>
             <a:endParaRPr lang="it-IT"/>
           </a:p>
@@ -594,7 +594,7 @@
           <a:p>
             <a:fld id="{0DAF859A-778D-45BB-B73F-DBDF9DC3F39E}" type="datetimeFigureOut">
               <a:rPr lang="it-IT" smtClean="0"/>
-              <a:t>23/04/2018</a:t>
+              <a:t>24/04/2018</a:t>
             </a:fld>
             <a:endParaRPr lang="it-IT"/>
           </a:p>
@@ -764,7 +764,7 @@
           <a:p>
             <a:fld id="{0DAF859A-778D-45BB-B73F-DBDF9DC3F39E}" type="datetimeFigureOut">
               <a:rPr lang="it-IT" smtClean="0"/>
-              <a:t>23/04/2018</a:t>
+              <a:t>24/04/2018</a:t>
             </a:fld>
             <a:endParaRPr lang="it-IT"/>
           </a:p>
@@ -1010,7 +1010,7 @@
           <a:p>
             <a:fld id="{0DAF859A-778D-45BB-B73F-DBDF9DC3F39E}" type="datetimeFigureOut">
               <a:rPr lang="it-IT" smtClean="0"/>
-              <a:t>23/04/2018</a:t>
+              <a:t>24/04/2018</a:t>
             </a:fld>
             <a:endParaRPr lang="it-IT"/>
           </a:p>
@@ -1242,7 +1242,7 @@
           <a:p>
             <a:fld id="{0DAF859A-778D-45BB-B73F-DBDF9DC3F39E}" type="datetimeFigureOut">
               <a:rPr lang="it-IT" smtClean="0"/>
-              <a:t>23/04/2018</a:t>
+              <a:t>24/04/2018</a:t>
             </a:fld>
             <a:endParaRPr lang="it-IT"/>
           </a:p>
@@ -1609,7 +1609,7 @@
           <a:p>
             <a:fld id="{0DAF859A-778D-45BB-B73F-DBDF9DC3F39E}" type="datetimeFigureOut">
               <a:rPr lang="it-IT" smtClean="0"/>
-              <a:t>23/04/2018</a:t>
+              <a:t>24/04/2018</a:t>
             </a:fld>
             <a:endParaRPr lang="it-IT"/>
           </a:p>
@@ -1727,7 +1727,7 @@
           <a:p>
             <a:fld id="{0DAF859A-778D-45BB-B73F-DBDF9DC3F39E}" type="datetimeFigureOut">
               <a:rPr lang="it-IT" smtClean="0"/>
-              <a:t>23/04/2018</a:t>
+              <a:t>24/04/2018</a:t>
             </a:fld>
             <a:endParaRPr lang="it-IT"/>
           </a:p>
@@ -1822,7 +1822,7 @@
           <a:p>
             <a:fld id="{0DAF859A-778D-45BB-B73F-DBDF9DC3F39E}" type="datetimeFigureOut">
               <a:rPr lang="it-IT" smtClean="0"/>
-              <a:t>23/04/2018</a:t>
+              <a:t>24/04/2018</a:t>
             </a:fld>
             <a:endParaRPr lang="it-IT"/>
           </a:p>
@@ -2099,7 +2099,7 @@
           <a:p>
             <a:fld id="{0DAF859A-778D-45BB-B73F-DBDF9DC3F39E}" type="datetimeFigureOut">
               <a:rPr lang="it-IT" smtClean="0"/>
-              <a:t>23/04/2018</a:t>
+              <a:t>24/04/2018</a:t>
             </a:fld>
             <a:endParaRPr lang="it-IT"/>
           </a:p>
@@ -2352,7 +2352,7 @@
           <a:p>
             <a:fld id="{0DAF859A-778D-45BB-B73F-DBDF9DC3F39E}" type="datetimeFigureOut">
               <a:rPr lang="it-IT" smtClean="0"/>
-              <a:t>23/04/2018</a:t>
+              <a:t>24/04/2018</a:t>
             </a:fld>
             <a:endParaRPr lang="it-IT"/>
           </a:p>
@@ -2565,7 +2565,7 @@
           <a:p>
             <a:fld id="{0DAF859A-778D-45BB-B73F-DBDF9DC3F39E}" type="datetimeFigureOut">
               <a:rPr lang="it-IT" smtClean="0"/>
-              <a:t>23/04/2018</a:t>
+              <a:t>24/04/2018</a:t>
             </a:fld>
             <a:endParaRPr lang="it-IT"/>
           </a:p>
@@ -3130,6 +3130,86 @@
           </a:p>
         </p:txBody>
       </p:sp>
+      <p:sp>
+        <p:nvSpPr>
+          <p:cNvPr id="2" name="Stella a 5 punte 1"/>
+          <p:cNvSpPr/>
+          <p:nvPr/>
+        </p:nvSpPr>
+        <p:spPr>
+          <a:xfrm>
+            <a:off x="6660108" y="2470244"/>
+            <a:ext cx="573206" cy="395785"/>
+          </a:xfrm>
+          <a:prstGeom prst="star5">
+            <a:avLst/>
+          </a:prstGeom>
+        </p:spPr>
+        <p:style>
+          <a:lnRef idx="2">
+            <a:schemeClr val="accent1">
+              <a:shade val="50000"/>
+            </a:schemeClr>
+          </a:lnRef>
+          <a:fillRef idx="1">
+            <a:schemeClr val="accent1"/>
+          </a:fillRef>
+          <a:effectRef idx="0">
+            <a:schemeClr val="accent1"/>
+          </a:effectRef>
+          <a:fontRef idx="minor">
+            <a:schemeClr val="lt1"/>
+          </a:fontRef>
+        </p:style>
+        <p:txBody>
+          <a:bodyPr rtlCol="0" anchor="ctr"/>
+          <a:lstStyle/>
+          <a:p>
+            <a:pPr algn="ctr"/>
+            <a:endParaRPr lang="it-IT"/>
+          </a:p>
+        </p:txBody>
+      </p:sp>
+      <p:sp>
+        <p:nvSpPr>
+          <p:cNvPr id="6" name="Stella a 5 punte 5"/>
+          <p:cNvSpPr/>
+          <p:nvPr/>
+        </p:nvSpPr>
+        <p:spPr>
+          <a:xfrm>
+            <a:off x="6660108" y="1926608"/>
+            <a:ext cx="573206" cy="395785"/>
+          </a:xfrm>
+          <a:prstGeom prst="star5">
+            <a:avLst/>
+          </a:prstGeom>
+        </p:spPr>
+        <p:style>
+          <a:lnRef idx="2">
+            <a:schemeClr val="accent1">
+              <a:shade val="50000"/>
+            </a:schemeClr>
+          </a:lnRef>
+          <a:fillRef idx="1">
+            <a:schemeClr val="accent1"/>
+          </a:fillRef>
+          <a:effectRef idx="0">
+            <a:schemeClr val="accent1"/>
+          </a:effectRef>
+          <a:fontRef idx="minor">
+            <a:schemeClr val="lt1"/>
+          </a:fontRef>
+        </p:style>
+        <p:txBody>
+          <a:bodyPr rtlCol="0" anchor="ctr"/>
+          <a:lstStyle/>
+          <a:p>
+            <a:pPr algn="ctr"/>
+            <a:endParaRPr lang="it-IT"/>
+          </a:p>
+        </p:txBody>
+      </p:sp>
     </p:spTree>
     <p:extLst>
       <p:ext uri="{BB962C8B-B14F-4D97-AF65-F5344CB8AC3E}">

</xml_diff>